<commit_message>
Refactor digit classification logic, remove unused HTML file, and enhance model saving process
</commit_message>
<xml_diff>
--- a/ML/CaseOpgave/Machine learning.pptx
+++ b/ML/CaseOpgave/Machine learning.pptx
@@ -219,7 +219,7 @@
           <a:p>
             <a:fld id="{15AA8E82-5235-434C-8665-0039FFC62550}" type="datetime1">
               <a:rPr lang="da-DK" smtClean="0"/>
-              <a:t>20-11-2024</a:t>
+              <a:t>21-11-2024</a:t>
             </a:fld>
             <a:endParaRPr lang="da-DK"/>
           </a:p>
@@ -399,7 +399,7 @@
             <a:fld id="{A42C8878-DF31-4A44-B73A-4441709004A4}" type="datetime1">
               <a:rPr lang="da-DK" smtClean="0"/>
               <a:pPr/>
-              <a:t>20-11-2024</a:t>
+              <a:t>21-11-2024</a:t>
             </a:fld>
             <a:endParaRPr lang="da-DK" dirty="0"/>
           </a:p>
@@ -1086,7 +1086,7 @@
             <a:pPr rtl="0"/>
             <a:fld id="{78B31ADD-16A8-46C9-8B86-B54E1EFF4ED6}" type="datetime1">
               <a:rPr lang="da-DK" noProof="0" smtClean="0"/>
-              <a:t>20-11-2024</a:t>
+              <a:t>21-11-2024</a:t>
             </a:fld>
             <a:endParaRPr lang="da-DK" noProof="0"/>
           </a:p>
@@ -1276,7 +1276,7 @@
             <a:pPr rtl="0"/>
             <a:fld id="{8F6031D3-A5DC-4A98-88EA-FAEF42BD7FA7}" type="datetime1">
               <a:rPr lang="da-DK" noProof="0" smtClean="0"/>
-              <a:t>20-11-2024</a:t>
+              <a:t>21-11-2024</a:t>
             </a:fld>
             <a:endParaRPr lang="da-DK" noProof="0"/>
           </a:p>
@@ -1652,7 +1652,7 @@
             <a:pPr rtl="0"/>
             <a:fld id="{8D312D2D-5669-49E0-80C3-280371F3B6FB}" type="datetime1">
               <a:rPr lang="da-DK" noProof="0" smtClean="0"/>
-              <a:t>20-11-2024</a:t>
+              <a:t>21-11-2024</a:t>
             </a:fld>
             <a:endParaRPr lang="da-DK" noProof="0"/>
           </a:p>
@@ -1908,7 +1908,7 @@
             <a:pPr rtl="0"/>
             <a:fld id="{1EF6381F-D652-4EC3-A1A3-CFEC1FC58CBB}" type="datetime1">
               <a:rPr lang="da-DK" noProof="0" smtClean="0"/>
-              <a:t>20-11-2024</a:t>
+              <a:t>21-11-2024</a:t>
             </a:fld>
             <a:endParaRPr lang="da-DK" noProof="0"/>
           </a:p>
@@ -2306,7 +2306,7 @@
             <a:pPr rtl="0"/>
             <a:fld id="{D41869E1-38D5-442C-9480-E429C5EB97A3}" type="datetime1">
               <a:rPr lang="da-DK" noProof="0" smtClean="0"/>
-              <a:t>20-11-2024</a:t>
+              <a:t>21-11-2024</a:t>
             </a:fld>
             <a:endParaRPr lang="da-DK" noProof="0"/>
           </a:p>
@@ -2445,7 +2445,7 @@
             <a:pPr rtl="0"/>
             <a:fld id="{E4D9E399-7A96-4C61-9167-FA3A2A0D4837}" type="datetime1">
               <a:rPr lang="da-DK" noProof="0" smtClean="0"/>
-              <a:t>20-11-2024</a:t>
+              <a:t>21-11-2024</a:t>
             </a:fld>
             <a:endParaRPr lang="da-DK" noProof="0"/>
           </a:p>
@@ -2605,7 +2605,7 @@
             <a:pPr rtl="0"/>
             <a:fld id="{A8E398DB-D01E-4082-BEE2-9304A94A61DF}" type="datetime1">
               <a:rPr lang="da-DK" noProof="0" smtClean="0"/>
-              <a:t>20-11-2024</a:t>
+              <a:t>21-11-2024</a:t>
             </a:fld>
             <a:endParaRPr lang="da-DK" noProof="0"/>
           </a:p>
@@ -2936,7 +2936,7 @@
             <a:pPr rtl="0"/>
             <a:fld id="{D99967C6-B554-4961-85CB-B74E585B8F7B}" type="datetime1">
               <a:rPr lang="da-DK" noProof="0" smtClean="0"/>
-              <a:t>20-11-2024</a:t>
+              <a:t>21-11-2024</a:t>
             </a:fld>
             <a:endParaRPr lang="da-DK" noProof="0"/>
           </a:p>
@@ -3289,7 +3289,7 @@
             <a:pPr rtl="0"/>
             <a:fld id="{9D109939-9DA8-409D-A4D1-5FB2C39D6808}" type="datetime1">
               <a:rPr lang="da-DK" noProof="0" smtClean="0"/>
-              <a:t>20-11-2024</a:t>
+              <a:t>21-11-2024</a:t>
             </a:fld>
             <a:endParaRPr lang="da-DK" noProof="0"/>
           </a:p>
@@ -3551,7 +3551,7 @@
             <a:pPr rtl="0"/>
             <a:fld id="{E9F3D07B-D1B4-4832-9FE9-698FA2CA9B7C}" type="datetime1">
               <a:rPr lang="da-DK" noProof="0" smtClean="0"/>
-              <a:t>20-11-2024</a:t>
+              <a:t>21-11-2024</a:t>
             </a:fld>
             <a:endParaRPr lang="da-DK" noProof="0" dirty="0"/>
           </a:p>
@@ -5182,31 +5182,6 @@
       </p:grpSpPr>
       <p:sp>
         <p:nvSpPr>
-          <p:cNvPr id="2" name="Titel 1">
-            <a:extLst>
-              <a:ext uri="{FF2B5EF4-FFF2-40B4-BE49-F238E27FC236}">
-                <a16:creationId xmlns:a16="http://schemas.microsoft.com/office/drawing/2014/main" id="{9AA778FC-A426-7D7B-3560-8A954C23F698}"/>
-              </a:ext>
-            </a:extLst>
-          </p:cNvPr>
-          <p:cNvSpPr>
-            <a:spLocks noGrp="1"/>
-          </p:cNvSpPr>
-          <p:nvPr>
-            <p:ph type="title"/>
-          </p:nvPr>
-        </p:nvSpPr>
-        <p:spPr/>
-        <p:txBody>
-          <a:bodyPr/>
-          <a:lstStyle/>
-          <a:p>
-            <a:endParaRPr lang="da-DK"/>
-          </a:p>
-        </p:txBody>
-      </p:sp>
-      <p:sp>
-        <p:nvSpPr>
           <p:cNvPr id="3" name="Pladsholder til indhold 2">
             <a:extLst>
               <a:ext uri="{FF2B5EF4-FFF2-40B4-BE49-F238E27FC236}">
@@ -5308,6 +5283,35 @@
           </a:prstGeom>
         </p:spPr>
       </p:pic>
+      <p:sp>
+        <p:nvSpPr>
+          <p:cNvPr id="5" name="Titel 4">
+            <a:extLst>
+              <a:ext uri="{FF2B5EF4-FFF2-40B4-BE49-F238E27FC236}">
+                <a16:creationId xmlns:a16="http://schemas.microsoft.com/office/drawing/2014/main" id="{E2622941-FA5D-3858-9CA5-D9526F8799F1}"/>
+              </a:ext>
+            </a:extLst>
+          </p:cNvPr>
+          <p:cNvSpPr>
+            <a:spLocks noGrp="1"/>
+          </p:cNvSpPr>
+          <p:nvPr>
+            <p:ph type="title"/>
+          </p:nvPr>
+        </p:nvSpPr>
+        <p:spPr/>
+        <p:txBody>
+          <a:bodyPr/>
+          <a:lstStyle/>
+          <a:p>
+            <a:r>
+              <a:rPr lang="da-DK" dirty="0" err="1"/>
+              <a:t>Evaluate</a:t>
+            </a:r>
+            <a:endParaRPr lang="da-DK" dirty="0"/>
+          </a:p>
+        </p:txBody>
+      </p:sp>
     </p:spTree>
     <p:extLst>
       <p:ext uri="{BB962C8B-B14F-4D97-AF65-F5344CB8AC3E}">
@@ -5364,7 +5368,11 @@
           <a:bodyPr/>
           <a:lstStyle/>
           <a:p>
-            <a:endParaRPr lang="en-US"/>
+            <a:r>
+              <a:rPr lang="en-US" dirty="0" err="1"/>
+              <a:t>Træning</a:t>
+            </a:r>
+            <a:endParaRPr lang="en-US" dirty="0"/>
           </a:p>
         </p:txBody>
       </p:sp>
@@ -6661,15 +6669,6 @@
 </file>
 
 <file path=customXml/item2.xml><?xml version="1.0" encoding="utf-8"?>
-<p:properties xmlns:p="http://schemas.microsoft.com/office/2006/metadata/properties" xmlns:xsi="http://www.w3.org/2001/XMLSchema-instance" xmlns:pc="http://schemas.microsoft.com/office/infopath/2007/PartnerControls">
-  <documentManagement>
-    <Status xmlns="71af3243-3dd4-4a8d-8c0d-dd76da1f02a5">Not started</Status>
-    <MediaServiceKeyPoints xmlns="71af3243-3dd4-4a8d-8c0d-dd76da1f02a5" xsi:nil="true"/>
-  </documentManagement>
-</p:properties>
-</file>
-
-<file path=customXml/item3.xml><?xml version="1.0" encoding="utf-8"?>
 <ct:contentTypeSchema xmlns:ct="http://schemas.microsoft.com/office/2006/metadata/contentType" xmlns:ma="http://schemas.microsoft.com/office/2006/metadata/properties/metaAttributes" ct:_="" ma:_="" ma:contentTypeName="Document" ma:contentTypeID="0x01010079F111ED35F8CC479449609E8A0923A6" ma:contentTypeVersion="12" ma:contentTypeDescription="Create a new document." ma:contentTypeScope="" ma:versionID="a410dd7f93c95333ffa1b60ed6adedd1">
   <xsd:schema xmlns:xsd="http://www.w3.org/2001/XMLSchema" xmlns:xs="http://www.w3.org/2001/XMLSchema" xmlns:p="http://schemas.microsoft.com/office/2006/metadata/properties" xmlns:ns2="71af3243-3dd4-4a8d-8c0d-dd76da1f02a5" xmlns:ns3="16c05727-aa75-4e4a-9b5f-8a80a1165891" targetNamespace="http://schemas.microsoft.com/office/2006/metadata/properties" ma:root="true" ma:fieldsID="a936d9baba76aa3866493feff160faab" ns2:_="" ns3:_="">
     <xsd:import namespace="71af3243-3dd4-4a8d-8c0d-dd76da1f02a5"/>
@@ -6890,6 +6889,15 @@
 </ct:contentTypeSchema>
 </file>
 
+<file path=customXml/item3.xml><?xml version="1.0" encoding="utf-8"?>
+<p:properties xmlns:p="http://schemas.microsoft.com/office/2006/metadata/properties" xmlns:xsi="http://www.w3.org/2001/XMLSchema-instance" xmlns:pc="http://schemas.microsoft.com/office/infopath/2007/PartnerControls">
+  <documentManagement>
+    <Status xmlns="71af3243-3dd4-4a8d-8c0d-dd76da1f02a5">Not started</Status>
+    <MediaServiceKeyPoints xmlns="71af3243-3dd4-4a8d-8c0d-dd76da1f02a5" xsi:nil="true"/>
+  </documentManagement>
+</p:properties>
+</file>
+
 <file path=customXml/itemProps1.xml><?xml version="1.0" encoding="utf-8"?>
 <ds:datastoreItem xmlns:ds="http://schemas.openxmlformats.org/officeDocument/2006/customXml" ds:itemID="{AA3F7EDC-E5B4-4BBC-9D2A-CBE6D46C37AD}">
   <ds:schemaRefs>
@@ -6899,16 +6907,6 @@
 </file>
 
 <file path=customXml/itemProps2.xml><?xml version="1.0" encoding="utf-8"?>
-<ds:datastoreItem xmlns:ds="http://schemas.openxmlformats.org/officeDocument/2006/customXml" ds:itemID="{A03EEFF0-FB57-4CB4-8BFC-DF397689E2ED}">
-  <ds:schemaRefs>
-    <ds:schemaRef ds:uri="http://schemas.microsoft.com/office/2006/metadata/properties"/>
-    <ds:schemaRef ds:uri="http://schemas.microsoft.com/office/infopath/2007/PartnerControls"/>
-    <ds:schemaRef ds:uri="71af3243-3dd4-4a8d-8c0d-dd76da1f02a5"/>
-  </ds:schemaRefs>
-</ds:datastoreItem>
-</file>
-
-<file path=customXml/itemProps3.xml><?xml version="1.0" encoding="utf-8"?>
 <ds:datastoreItem xmlns:ds="http://schemas.openxmlformats.org/officeDocument/2006/customXml" ds:itemID="{93932EF5-314F-409E-8020-FEE5FA0795B9}">
   <ds:schemaRefs>
     <ds:schemaRef ds:uri="http://schemas.microsoft.com/office/2006/metadata/contentType"/>
@@ -6925,4 +6923,14 @@
     <ds:schemaRef ds:uri="http://schemas.microsoft.com/internal/obd"/>
   </ds:schemaRefs>
 </ds:datastoreItem>
+</file>
+
+<file path=customXml/itemProps3.xml><?xml version="1.0" encoding="utf-8"?>
+<ds:datastoreItem xmlns:ds="http://schemas.openxmlformats.org/officeDocument/2006/customXml" ds:itemID="{A03EEFF0-FB57-4CB4-8BFC-DF397689E2ED}">
+  <ds:schemaRefs>
+    <ds:schemaRef ds:uri="http://schemas.microsoft.com/office/2006/metadata/properties"/>
+    <ds:schemaRef ds:uri="http://schemas.microsoft.com/office/infopath/2007/PartnerControls"/>
+    <ds:schemaRef ds:uri="71af3243-3dd4-4a8d-8c0d-dd76da1f02a5"/>
+  </ds:schemaRefs>
+</ds:datastoreItem>
 </file>
</xml_diff>